<commit_message>
Moved pictures to top right.
Moved the pictures to top right of the poster as McGrath instucted us to
do.
</commit_message>
<xml_diff>
--- a/Spring17/Poster/Team28EHyroExpoPoster.pptx
+++ b/Spring17/Poster/Team28EHyroExpoPoster.pptx
@@ -242,7 +242,7 @@
           <a:p>
             <a:fld id="{7395F848-6DDA-9042-95D4-0071278BB24B}" type="datetimeFigureOut">
               <a:rPr lang="en-US" smtClean="0"/>
-              <a:t>4/28/2017</a:t>
+              <a:t>4/30/2017</a:t>
             </a:fld>
             <a:endParaRPr lang="en-US"/>
           </a:p>
@@ -1390,7 +1390,7 @@
           <a:p>
             <a:fld id="{56B6BD69-149A-CD41-9E7C-E241C9398BA0}" type="datetimeFigureOut">
               <a:rPr lang="en-US" smtClean="0"/>
-              <a:t>4/28/2017</a:t>
+              <a:t>4/30/2017</a:t>
             </a:fld>
             <a:endParaRPr lang="en-US"/>
           </a:p>
@@ -1568,7 +1568,7 @@
           <a:p>
             <a:fld id="{56B6BD69-149A-CD41-9E7C-E241C9398BA0}" type="datetimeFigureOut">
               <a:rPr lang="en-US" smtClean="0"/>
-              <a:t>4/28/2017</a:t>
+              <a:t>4/30/2017</a:t>
             </a:fld>
             <a:endParaRPr lang="en-US"/>
           </a:p>
@@ -1736,7 +1736,7 @@
           <a:p>
             <a:fld id="{56B6BD69-149A-CD41-9E7C-E241C9398BA0}" type="datetimeFigureOut">
               <a:rPr lang="en-US" smtClean="0"/>
-              <a:t>4/28/2017</a:t>
+              <a:t>4/30/2017</a:t>
             </a:fld>
             <a:endParaRPr lang="en-US"/>
           </a:p>
@@ -1981,7 +1981,7 @@
           <a:p>
             <a:fld id="{56B6BD69-149A-CD41-9E7C-E241C9398BA0}" type="datetimeFigureOut">
               <a:rPr lang="en-US" smtClean="0"/>
-              <a:t>4/28/2017</a:t>
+              <a:t>4/30/2017</a:t>
             </a:fld>
             <a:endParaRPr lang="en-US"/>
           </a:p>
@@ -2266,7 +2266,7 @@
           <a:p>
             <a:fld id="{56B6BD69-149A-CD41-9E7C-E241C9398BA0}" type="datetimeFigureOut">
               <a:rPr lang="en-US" smtClean="0"/>
-              <a:t>4/28/2017</a:t>
+              <a:t>4/30/2017</a:t>
             </a:fld>
             <a:endParaRPr lang="en-US"/>
           </a:p>
@@ -2690,7 +2690,7 @@
           <a:p>
             <a:fld id="{56B6BD69-149A-CD41-9E7C-E241C9398BA0}" type="datetimeFigureOut">
               <a:rPr lang="en-US" smtClean="0"/>
-              <a:t>4/28/2017</a:t>
+              <a:t>4/30/2017</a:t>
             </a:fld>
             <a:endParaRPr lang="en-US"/>
           </a:p>
@@ -2807,7 +2807,7 @@
           <a:p>
             <a:fld id="{56B6BD69-149A-CD41-9E7C-E241C9398BA0}" type="datetimeFigureOut">
               <a:rPr lang="en-US" smtClean="0"/>
-              <a:t>4/28/2017</a:t>
+              <a:t>4/30/2017</a:t>
             </a:fld>
             <a:endParaRPr lang="en-US"/>
           </a:p>
@@ -2902,7 +2902,7 @@
           <a:p>
             <a:fld id="{56B6BD69-149A-CD41-9E7C-E241C9398BA0}" type="datetimeFigureOut">
               <a:rPr lang="en-US" smtClean="0"/>
-              <a:t>4/28/2017</a:t>
+              <a:t>4/30/2017</a:t>
             </a:fld>
             <a:endParaRPr lang="en-US"/>
           </a:p>
@@ -3177,7 +3177,7 @@
           <a:p>
             <a:fld id="{56B6BD69-149A-CD41-9E7C-E241C9398BA0}" type="datetimeFigureOut">
               <a:rPr lang="en-US" smtClean="0"/>
-              <a:t>4/28/2017</a:t>
+              <a:t>4/30/2017</a:t>
             </a:fld>
             <a:endParaRPr lang="en-US"/>
           </a:p>
@@ -3432,7 +3432,7 @@
           <a:p>
             <a:fld id="{56B6BD69-149A-CD41-9E7C-E241C9398BA0}" type="datetimeFigureOut">
               <a:rPr lang="en-US" smtClean="0"/>
-              <a:t>4/28/2017</a:t>
+              <a:t>4/30/2017</a:t>
             </a:fld>
             <a:endParaRPr lang="en-US"/>
           </a:p>
@@ -3644,7 +3644,7 @@
           <a:p>
             <a:fld id="{56B6BD69-149A-CD41-9E7C-E241C9398BA0}" type="datetimeFigureOut">
               <a:rPr lang="en-US" smtClean="0"/>
-              <a:t>4/28/2017</a:t>
+              <a:t>4/30/2017</a:t>
             </a:fld>
             <a:endParaRPr lang="en-US"/>
           </a:p>
@@ -4765,7 +4765,7 @@
         </p:nvSpPr>
         <p:spPr>
           <a:xfrm>
-            <a:off x="34493200" y="2626822"/>
+            <a:off x="34493200" y="6639479"/>
             <a:ext cx="7827420" cy="2146611"/>
           </a:xfrm>
           <a:prstGeom prst="rect">
@@ -4952,7 +4952,7 @@
         </p:nvSpPr>
         <p:spPr>
           <a:xfrm>
-            <a:off x="34493201" y="12674612"/>
+            <a:off x="34166252" y="17384082"/>
             <a:ext cx="7827420" cy="11394756"/>
           </a:xfrm>
           <a:prstGeom prst="rect">
@@ -5146,7 +5146,7 @@
         </p:blipFill>
         <p:spPr>
           <a:xfrm>
-            <a:off x="34843453" y="5331461"/>
+            <a:off x="34790472" y="9517380"/>
             <a:ext cx="6545179" cy="6024797"/>
           </a:xfrm>
           <a:prstGeom prst="rect">
@@ -5242,7 +5242,7 @@
         </p:blipFill>
         <p:spPr>
           <a:xfrm>
-            <a:off x="40180816" y="24206951"/>
+            <a:off x="40104444" y="2204207"/>
             <a:ext cx="3061455" cy="3226479"/>
           </a:xfrm>
           <a:prstGeom prst="rect">
@@ -5266,7 +5266,7 @@
         </p:blipFill>
         <p:spPr>
           <a:xfrm>
-            <a:off x="36713536" y="24206951"/>
+            <a:off x="36651225" y="2206275"/>
             <a:ext cx="3043201" cy="3286670"/>
           </a:xfrm>
           <a:prstGeom prst="rect">
@@ -5282,7 +5282,7 @@
         </p:nvSpPr>
         <p:spPr>
           <a:xfrm>
-            <a:off x="40541285" y="27599743"/>
+            <a:off x="40374350" y="5468343"/>
             <a:ext cx="2700986" cy="707886"/>
           </a:xfrm>
           <a:prstGeom prst="rect">
@@ -5336,7 +5336,7 @@
         </p:nvSpPr>
         <p:spPr>
           <a:xfrm>
-            <a:off x="36241210" y="27631204"/>
+            <a:off x="36090637" y="5475056"/>
             <a:ext cx="4632547" cy="707886"/>
           </a:xfrm>
           <a:prstGeom prst="rect">
@@ -5390,7 +5390,7 @@
         </p:blipFill>
         <p:spPr>
           <a:xfrm>
-            <a:off x="33339739" y="24254684"/>
+            <a:off x="33339737" y="2204207"/>
             <a:ext cx="2901471" cy="3139401"/>
           </a:xfrm>
           <a:prstGeom prst="rect">
@@ -5406,7 +5406,7 @@
         </p:nvSpPr>
         <p:spPr>
           <a:xfrm>
-            <a:off x="33431519" y="27579401"/>
+            <a:off x="33523301" y="5468343"/>
             <a:ext cx="2717909" cy="707886"/>
           </a:xfrm>
           <a:prstGeom prst="rect">
@@ -5439,7 +5439,7 @@
         </p:nvSpPr>
         <p:spPr>
           <a:xfrm>
-            <a:off x="35920172" y="11389239"/>
+            <a:off x="35903271" y="16170742"/>
             <a:ext cx="4319580" cy="584775"/>
           </a:xfrm>
           <a:prstGeom prst="rect">

</xml_diff>